<commit_message>
Sample result & PPT
</commit_message>
<xml_diff>
--- a/Cyber Security Intership ppt.pptx
+++ b/Cyber Security Intership ppt.pptx
@@ -5,7 +5,7 @@
     <p:sldMasterId id="2147483712" r:id="rId4"/>
   </p:sldMasterIdLst>
   <p:notesMasterIdLst>
-    <p:notesMasterId r:id="rId18"/>
+    <p:notesMasterId r:id="rId19"/>
   </p:notesMasterIdLst>
   <p:sldIdLst>
     <p:sldId id="256" r:id="rId5"/>
@@ -16,11 +16,12 @@
     <p:sldId id="265" r:id="rId10"/>
     <p:sldId id="2146847057" r:id="rId11"/>
     <p:sldId id="2146847063" r:id="rId12"/>
-    <p:sldId id="2146847060" r:id="rId13"/>
-    <p:sldId id="2146847062" r:id="rId14"/>
-    <p:sldId id="2146847061" r:id="rId15"/>
-    <p:sldId id="2146847055" r:id="rId16"/>
-    <p:sldId id="259" r:id="rId17"/>
+    <p:sldId id="2146847065" r:id="rId13"/>
+    <p:sldId id="2146847060" r:id="rId14"/>
+    <p:sldId id="2146847062" r:id="rId15"/>
+    <p:sldId id="2146847061" r:id="rId16"/>
+    <p:sldId id="2146847055" r:id="rId17"/>
+    <p:sldId id="259" r:id="rId18"/>
   </p:sldIdLst>
   <p:sldSz cx="12192000" cy="6858000"/>
   <p:notesSz cx="6858000" cy="9144000"/>
@@ -220,7 +221,7 @@
           <a:p>
             <a:fld id="{46256A78-79A6-408F-8148-4F87BB81602D}" type="datetimeFigureOut">
               <a:rPr lang="en-IN" smtClean="0"/>
-              <a:t>25-02-2025</a:t>
+              <a:t>26-02-2025</a:t>
             </a:fld>
             <a:endParaRPr lang="en-IN"/>
           </a:p>
@@ -724,7 +725,7 @@
           <a:p>
             <a:fld id="{ED291B17-9318-49DB-B28B-6E5994AE9581}" type="datetime1">
               <a:rPr lang="en-US" smtClean="0"/>
-              <a:t>2/25/2025</a:t>
+              <a:t>2/26/2025</a:t>
             </a:fld>
             <a:endParaRPr lang="en-US"/>
           </a:p>
@@ -933,7 +934,7 @@
           <a:p>
             <a:fld id="{2CED4963-E985-44C4-B8C4-FDD613B7C2F8}" type="datetime1">
               <a:rPr lang="en-US" smtClean="0"/>
-              <a:t>2/25/2025</a:t>
+              <a:t>2/26/2025</a:t>
             </a:fld>
             <a:endParaRPr lang="en-US"/>
           </a:p>
@@ -1301,7 +1302,7 @@
           <a:p>
             <a:fld id="{ED291B17-9318-49DB-B28B-6E5994AE9581}" type="datetime1">
               <a:rPr lang="en-US" smtClean="0"/>
-              <a:t>2/25/2025</a:t>
+              <a:t>2/26/2025</a:t>
             </a:fld>
             <a:endParaRPr lang="en-US"/>
           </a:p>
@@ -1505,7 +1506,7 @@
           <a:p>
             <a:fld id="{78DD82B9-B8EE-4375-B6FF-88FA6ABB15D9}" type="datetime1">
               <a:rPr lang="en-US" smtClean="0"/>
-              <a:t>2/25/2025</a:t>
+              <a:t>2/26/2025</a:t>
             </a:fld>
             <a:endParaRPr lang="en-US"/>
           </a:p>
@@ -1762,7 +1763,7 @@
           <a:p>
             <a:fld id="{B2497495-0637-405E-AE64-5CC7506D51F5}" type="datetime1">
               <a:rPr lang="en-US" smtClean="0"/>
-              <a:t>2/25/2025</a:t>
+              <a:t>2/26/2025</a:t>
             </a:fld>
             <a:endParaRPr lang="en-US"/>
           </a:p>
@@ -2020,7 +2021,7 @@
           <a:p>
             <a:fld id="{7BFFD690-9426-415D-8B65-26881E07B2D4}" type="datetime1">
               <a:rPr lang="en-US" smtClean="0"/>
-              <a:t>2/25/2025</a:t>
+              <a:t>2/26/2025</a:t>
             </a:fld>
             <a:endParaRPr lang="en-US"/>
           </a:p>
@@ -2447,7 +2448,7 @@
           <a:p>
             <a:fld id="{04C4989A-474C-40DE-95B9-011C28B71673}" type="datetime1">
               <a:rPr lang="en-US" smtClean="0"/>
-              <a:t>2/25/2025</a:t>
+              <a:t>2/26/2025</a:t>
             </a:fld>
             <a:endParaRPr lang="en-US"/>
           </a:p>
@@ -2577,7 +2578,7 @@
           <a:p>
             <a:fld id="{5DB4ED54-5B5E-4A04-93D3-5772E3CE3818}" type="datetime1">
               <a:rPr lang="en-US" smtClean="0"/>
-              <a:t>2/25/2025</a:t>
+              <a:t>2/26/2025</a:t>
             </a:fld>
             <a:endParaRPr lang="en-US"/>
           </a:p>
@@ -2680,7 +2681,7 @@
           <a:p>
             <a:fld id="{4EDE50D6-574B-40AF-946F-D52A04ADE379}" type="datetime1">
               <a:rPr lang="en-US" smtClean="0"/>
-              <a:t>2/25/2025</a:t>
+              <a:t>2/26/2025</a:t>
             </a:fld>
             <a:endParaRPr lang="en-US"/>
           </a:p>
@@ -3063,7 +3064,7 @@
           <a:p>
             <a:fld id="{D82884F1-FFEA-405F-9602-3DCA865EDA4E}" type="datetime1">
               <a:rPr lang="en-US" smtClean="0"/>
-              <a:t>2/25/2025</a:t>
+              <a:t>2/26/2025</a:t>
             </a:fld>
             <a:endParaRPr lang="en-US"/>
           </a:p>
@@ -3357,7 +3358,7 @@
           <a:p>
             <a:fld id="{7E18DB4A-8810-4A10-AD5C-D5E2C667F5B3}" type="datetime1">
               <a:rPr lang="en-US" smtClean="0"/>
-              <a:t>2/25/2025</a:t>
+              <a:t>2/26/2025</a:t>
             </a:fld>
             <a:endParaRPr lang="en-US"/>
           </a:p>
@@ -3578,7 +3579,7 @@
           <a:p>
             <a:fld id="{ED291B17-9318-49DB-B28B-6E5994AE9581}" type="datetime1">
               <a:rPr lang="en-US" smtClean="0"/>
-              <a:t>2/25/2025</a:t>
+              <a:t>2/26/2025</a:t>
             </a:fld>
             <a:endParaRPr lang="en-US"/>
           </a:p>
@@ -4400,6 +4401,255 @@
           <p:cNvPr id="2" name="Title 1">
             <a:extLst>
               <a:ext uri="{FF2B5EF4-FFF2-40B4-BE49-F238E27FC236}">
+                <a16:creationId xmlns:a16="http://schemas.microsoft.com/office/drawing/2014/main" id="{A4F8070C-FF0D-BBE3-3D8A-C3794CCCE8A2}"/>
+              </a:ext>
+            </a:extLst>
+          </p:cNvPr>
+          <p:cNvSpPr>
+            <a:spLocks noGrp="1"/>
+          </p:cNvSpPr>
+          <p:nvPr>
+            <p:ph type="title"/>
+          </p:nvPr>
+        </p:nvSpPr>
+        <p:spPr/>
+        <p:txBody>
+          <a:bodyPr/>
+          <a:lstStyle/>
+          <a:p>
+            <a:r>
+              <a:rPr lang="en-IN" dirty="0">
+                <a:solidFill>
+                  <a:schemeClr val="accent1"/>
+                </a:solidFill>
+              </a:rPr>
+              <a:t>Results</a:t>
+            </a:r>
+          </a:p>
+        </p:txBody>
+      </p:sp>
+      <p:sp>
+        <p:nvSpPr>
+          <p:cNvPr id="4" name="Rectangle 1">
+            <a:extLst>
+              <a:ext uri="{FF2B5EF4-FFF2-40B4-BE49-F238E27FC236}">
+                <a16:creationId xmlns:a16="http://schemas.microsoft.com/office/drawing/2014/main" id="{12ABF3CD-31FE-5DF8-CBA5-F8E6B5562C16}"/>
+              </a:ext>
+            </a:extLst>
+          </p:cNvPr>
+          <p:cNvSpPr>
+            <a:spLocks noChangeArrowheads="1"/>
+          </p:cNvSpPr>
+          <p:nvPr/>
+        </p:nvSpPr>
+        <p:spPr bwMode="auto">
+          <a:xfrm>
+            <a:off x="774232" y="585753"/>
+            <a:ext cx="10340808" cy="4265270"/>
+          </a:xfrm>
+          <a:prstGeom prst="rect">
+            <a:avLst/>
+          </a:prstGeom>
+          <a:noFill/>
+          <a:ln>
+            <a:noFill/>
+          </a:ln>
+          <a:effectLst/>
+          <a:extLst>
+            <a:ext uri="{909E8E84-426E-40DD-AFC4-6F175D3DCCD1}">
+              <a14:hiddenFill xmlns:a14="http://schemas.microsoft.com/office/drawing/2010/main">
+                <a:solidFill>
+                  <a:schemeClr val="accent1"/>
+                </a:solidFill>
+              </a14:hiddenFill>
+            </a:ext>
+            <a:ext uri="{91240B29-F687-4F45-9708-019B960494DF}">
+              <a14:hiddenLine xmlns:a14="http://schemas.microsoft.com/office/drawing/2010/main" w="9525">
+                <a:solidFill>
+                  <a:schemeClr val="tx1"/>
+                </a:solidFill>
+                <a:miter lim="800000"/>
+                <a:headEnd/>
+                <a:tailEnd/>
+              </a14:hiddenLine>
+            </a:ext>
+            <a:ext uri="{AF507438-7753-43E0-B8FC-AC1667EBCBE1}">
+              <a14:hiddenEffects xmlns:a14="http://schemas.microsoft.com/office/drawing/2010/main">
+                <a:effectLst>
+                  <a:outerShdw dist="35921" dir="2700000" algn="ctr" rotWithShape="0">
+                    <a:schemeClr val="bg2"/>
+                  </a:outerShdw>
+                </a:effectLst>
+              </a14:hiddenEffects>
+            </a:ext>
+          </a:extLst>
+        </p:spPr>
+        <p:txBody>
+          <a:bodyPr vert="horz" wrap="square" lIns="91440" tIns="45720" rIns="91440" bIns="45720" numCol="1" anchor="ctr" anchorCtr="0" compatLnSpc="1">
+            <a:prstTxWarp prst="textNoShape">
+              <a:avLst/>
+            </a:prstTxWarp>
+            <a:spAutoFit/>
+          </a:bodyPr>
+          <a:lstStyle/>
+          <a:p>
+            <a:pPr marL="346075" marR="0" lvl="0" indent="-346075" algn="l" defTabSz="914400" rtl="0" eaLnBrk="0" fontAlgn="base" latinLnBrk="0" hangingPunct="0">
+              <a:lnSpc>
+                <a:spcPct val="300000"/>
+              </a:lnSpc>
+              <a:spcBef>
+                <a:spcPct val="0"/>
+              </a:spcBef>
+              <a:spcAft>
+                <a:spcPct val="0"/>
+              </a:spcAft>
+              <a:buClrTx/>
+              <a:buSzTx/>
+              <a:buFontTx/>
+              <a:buNone/>
+              <a:tabLst/>
+            </a:pPr>
+            <a:endParaRPr kumimoji="0" lang="en-US" altLang="en-US" sz="1800" b="0" i="0" u="none" strike="noStrike" cap="none" normalizeH="0" baseline="0" dirty="0">
+              <a:ln>
+                <a:noFill/>
+              </a:ln>
+              <a:solidFill>
+                <a:schemeClr val="tx1"/>
+              </a:solidFill>
+              <a:effectLst/>
+              <a:latin typeface="Arial" panose="020B0604020202020204" pitchFamily="34" charset="0"/>
+            </a:endParaRPr>
+          </a:p>
+          <a:p>
+            <a:pPr marL="346075" marR="0" lvl="0" indent="-346075" algn="l" defTabSz="914400" rtl="0" eaLnBrk="0" fontAlgn="base" latinLnBrk="0" hangingPunct="0">
+              <a:lnSpc>
+                <a:spcPct val="250000"/>
+              </a:lnSpc>
+              <a:spcBef>
+                <a:spcPct val="0"/>
+              </a:spcBef>
+              <a:spcAft>
+                <a:spcPct val="0"/>
+              </a:spcAft>
+              <a:buClrTx/>
+              <a:buSzTx/>
+              <a:buFontTx/>
+              <a:buChar char="•"/>
+              <a:tabLst/>
+            </a:pPr>
+            <a:r>
+              <a:rPr kumimoji="0" lang="en-US" altLang="en-US" sz="1800" b="0" i="0" u="none" strike="noStrike" cap="none" normalizeH="0" baseline="0" dirty="0">
+                <a:ln>
+                  <a:noFill/>
+                </a:ln>
+                <a:solidFill>
+                  <a:schemeClr val="tx1"/>
+                </a:solidFill>
+                <a:effectLst/>
+                <a:latin typeface="Arial" panose="020B0604020202020204" pitchFamily="34" charset="0"/>
+              </a:rPr>
+              <a:t>The project successfully hides and retrieves encrypted data within image files, ensuring that the original image's visual quality remains intact.</a:t>
+            </a:r>
+          </a:p>
+          <a:p>
+            <a:pPr marL="346075" marR="0" lvl="0" indent="-346075" algn="l" defTabSz="914400" rtl="0" eaLnBrk="0" fontAlgn="base" latinLnBrk="0" hangingPunct="0">
+              <a:lnSpc>
+                <a:spcPct val="250000"/>
+              </a:lnSpc>
+              <a:spcBef>
+                <a:spcPct val="0"/>
+              </a:spcBef>
+              <a:spcAft>
+                <a:spcPct val="0"/>
+              </a:spcAft>
+              <a:buClrTx/>
+              <a:buSzTx/>
+              <a:buFontTx/>
+              <a:buChar char="•"/>
+              <a:tabLst/>
+            </a:pPr>
+            <a:r>
+              <a:rPr kumimoji="0" lang="en-US" altLang="en-US" sz="1800" b="0" i="0" u="none" strike="noStrike" cap="none" normalizeH="0" baseline="0" dirty="0">
+                <a:ln>
+                  <a:noFill/>
+                </a:ln>
+                <a:solidFill>
+                  <a:schemeClr val="tx1"/>
+                </a:solidFill>
+                <a:effectLst/>
+                <a:latin typeface="Arial" panose="020B0604020202020204" pitchFamily="34" charset="0"/>
+              </a:rPr>
+              <a:t>The cryptographic techniques ensure that even if someone accesses the image, the hidden data remains protected, only retrievable by authorized users.</a:t>
+            </a:r>
+          </a:p>
+          <a:p>
+            <a:pPr marL="346075" marR="0" lvl="0" indent="-346075" algn="l" defTabSz="914400" rtl="0" eaLnBrk="0" fontAlgn="base" latinLnBrk="0" hangingPunct="0">
+              <a:lnSpc>
+                <a:spcPct val="250000"/>
+              </a:lnSpc>
+              <a:spcBef>
+                <a:spcPct val="0"/>
+              </a:spcBef>
+              <a:spcAft>
+                <a:spcPct val="0"/>
+              </a:spcAft>
+              <a:buClrTx/>
+              <a:buSzTx/>
+              <a:buFontTx/>
+              <a:buChar char="•"/>
+              <a:tabLst/>
+            </a:pPr>
+            <a:r>
+              <a:rPr kumimoji="0" lang="en-US" altLang="en-US" sz="1800" b="0" i="0" u="none" strike="noStrike" cap="none" normalizeH="0" baseline="0" dirty="0">
+                <a:ln>
+                  <a:noFill/>
+                </a:ln>
+                <a:solidFill>
+                  <a:schemeClr val="tx1"/>
+                </a:solidFill>
+                <a:effectLst/>
+                <a:latin typeface="Arial" panose="020B0604020202020204" pitchFamily="34" charset="0"/>
+              </a:rPr>
+              <a:t>A functional tool for secure communication using steganography and encryption methods. </a:t>
+            </a:r>
+          </a:p>
+        </p:txBody>
+      </p:sp>
+    </p:spTree>
+    <p:extLst>
+      <p:ext uri="{BB962C8B-B14F-4D97-AF65-F5344CB8AC3E}">
+        <p14:creationId xmlns:p14="http://schemas.microsoft.com/office/powerpoint/2010/main" val="2083715239"/>
+      </p:ext>
+    </p:extLst>
+  </p:cSld>
+  <p:clrMapOvr>
+    <a:masterClrMapping/>
+  </p:clrMapOvr>
+</p:sld>
+</file>
+
+<file path=ppt/slides/slide11.xml><?xml version="1.0" encoding="utf-8"?>
+<p:sld xmlns:a="http://schemas.openxmlformats.org/drawingml/2006/main" xmlns:r="http://schemas.openxmlformats.org/officeDocument/2006/relationships" xmlns:p="http://schemas.openxmlformats.org/presentationml/2006/main">
+  <p:cSld>
+    <p:spTree>
+      <p:nvGrpSpPr>
+        <p:cNvPr id="1" name=""/>
+        <p:cNvGrpSpPr/>
+        <p:nvPr/>
+      </p:nvGrpSpPr>
+      <p:grpSpPr>
+        <a:xfrm>
+          <a:off x="0" y="0"/>
+          <a:ext cx="0" cy="0"/>
+          <a:chOff x="0" y="0"/>
+          <a:chExt cx="0" cy="0"/>
+        </a:xfrm>
+      </p:grpSpPr>
+      <p:sp>
+        <p:nvSpPr>
+          <p:cNvPr id="2" name="Title 1">
+            <a:extLst>
+              <a:ext uri="{FF2B5EF4-FFF2-40B4-BE49-F238E27FC236}">
                 <a16:creationId xmlns:a16="http://schemas.microsoft.com/office/drawing/2014/main" id="{FA4C6B3D-1072-C2D2-EBFE-E33CABE394D1}"/>
               </a:ext>
             </a:extLst>
@@ -4629,101 +4879,6 @@
 </p:sld>
 </file>
 
-<file path=ppt/slides/slide11.xml><?xml version="1.0" encoding="utf-8"?>
-<p:sld xmlns:a="http://schemas.openxmlformats.org/drawingml/2006/main" xmlns:r="http://schemas.openxmlformats.org/officeDocument/2006/relationships" xmlns:p="http://schemas.openxmlformats.org/presentationml/2006/main">
-  <p:cSld>
-    <p:spTree>
-      <p:nvGrpSpPr>
-        <p:cNvPr id="1" name=""/>
-        <p:cNvGrpSpPr/>
-        <p:nvPr/>
-      </p:nvGrpSpPr>
-      <p:grpSpPr>
-        <a:xfrm>
-          <a:off x="0" y="0"/>
-          <a:ext cx="0" cy="0"/>
-          <a:chOff x="0" y="0"/>
-          <a:chExt cx="0" cy="0"/>
-        </a:xfrm>
-      </p:grpSpPr>
-      <p:sp>
-        <p:nvSpPr>
-          <p:cNvPr id="2" name="Title 1">
-            <a:extLst>
-              <a:ext uri="{FF2B5EF4-FFF2-40B4-BE49-F238E27FC236}">
-                <a16:creationId xmlns:a16="http://schemas.microsoft.com/office/drawing/2014/main" id="{48E9F08C-D61F-627D-C4E5-397E3E84FC45}"/>
-              </a:ext>
-            </a:extLst>
-          </p:cNvPr>
-          <p:cNvSpPr>
-            <a:spLocks noGrp="1"/>
-          </p:cNvSpPr>
-          <p:nvPr>
-            <p:ph type="title"/>
-          </p:nvPr>
-        </p:nvSpPr>
-        <p:spPr/>
-        <p:txBody>
-          <a:bodyPr/>
-          <a:lstStyle/>
-          <a:p>
-            <a:r>
-              <a:rPr lang="en-IN" dirty="0">
-                <a:solidFill>
-                  <a:schemeClr val="accent1"/>
-                </a:solidFill>
-              </a:rPr>
-              <a:t>GitHub Link</a:t>
-            </a:r>
-          </a:p>
-        </p:txBody>
-      </p:sp>
-      <p:sp>
-        <p:nvSpPr>
-          <p:cNvPr id="3" name="Content Placeholder 2">
-            <a:extLst>
-              <a:ext uri="{FF2B5EF4-FFF2-40B4-BE49-F238E27FC236}">
-                <a16:creationId xmlns:a16="http://schemas.microsoft.com/office/drawing/2014/main" id="{51A299DD-46FA-7866-41D8-C1BFCC2F69DD}"/>
-              </a:ext>
-            </a:extLst>
-          </p:cNvPr>
-          <p:cNvSpPr>
-            <a:spLocks noGrp="1"/>
-          </p:cNvSpPr>
-          <p:nvPr>
-            <p:ph idx="1"/>
-          </p:nvPr>
-        </p:nvSpPr>
-        <p:spPr>
-          <a:xfrm>
-            <a:off x="719416" y="1567174"/>
-            <a:ext cx="6383134" cy="530296"/>
-          </a:xfrm>
-        </p:spPr>
-        <p:txBody>
-          <a:bodyPr/>
-          <a:lstStyle/>
-          <a:p>
-            <a:r>
-              <a:rPr lang="en-IN" dirty="0"/>
-              <a:t>https://github.com/Ankitkumar341/stenography_project</a:t>
-            </a:r>
-          </a:p>
-        </p:txBody>
-      </p:sp>
-    </p:spTree>
-    <p:extLst>
-      <p:ext uri="{BB962C8B-B14F-4D97-AF65-F5344CB8AC3E}">
-        <p14:creationId xmlns:p14="http://schemas.microsoft.com/office/powerpoint/2010/main" val="2230664768"/>
-      </p:ext>
-    </p:extLst>
-  </p:cSld>
-  <p:clrMapOvr>
-    <a:masterClrMapping/>
-  </p:clrMapOvr>
-</p:sld>
-</file>
-
 <file path=ppt/slides/slide12.xml><?xml version="1.0" encoding="utf-8"?>
 <p:sld xmlns:a="http://schemas.openxmlformats.org/drawingml/2006/main" xmlns:r="http://schemas.openxmlformats.org/officeDocument/2006/relationships" xmlns:p="http://schemas.openxmlformats.org/presentationml/2006/main">
   <p:cSld>
@@ -4743,6 +4898,101 @@
       </p:grpSpPr>
       <p:sp>
         <p:nvSpPr>
+          <p:cNvPr id="2" name="Title 1">
+            <a:extLst>
+              <a:ext uri="{FF2B5EF4-FFF2-40B4-BE49-F238E27FC236}">
+                <a16:creationId xmlns:a16="http://schemas.microsoft.com/office/drawing/2014/main" id="{48E9F08C-D61F-627D-C4E5-397E3E84FC45}"/>
+              </a:ext>
+            </a:extLst>
+          </p:cNvPr>
+          <p:cNvSpPr>
+            <a:spLocks noGrp="1"/>
+          </p:cNvSpPr>
+          <p:nvPr>
+            <p:ph type="title"/>
+          </p:nvPr>
+        </p:nvSpPr>
+        <p:spPr/>
+        <p:txBody>
+          <a:bodyPr/>
+          <a:lstStyle/>
+          <a:p>
+            <a:r>
+              <a:rPr lang="en-IN" dirty="0">
+                <a:solidFill>
+                  <a:schemeClr val="accent1"/>
+                </a:solidFill>
+              </a:rPr>
+              <a:t>GitHub Link</a:t>
+            </a:r>
+          </a:p>
+        </p:txBody>
+      </p:sp>
+      <p:sp>
+        <p:nvSpPr>
+          <p:cNvPr id="3" name="Content Placeholder 2">
+            <a:extLst>
+              <a:ext uri="{FF2B5EF4-FFF2-40B4-BE49-F238E27FC236}">
+                <a16:creationId xmlns:a16="http://schemas.microsoft.com/office/drawing/2014/main" id="{51A299DD-46FA-7866-41D8-C1BFCC2F69DD}"/>
+              </a:ext>
+            </a:extLst>
+          </p:cNvPr>
+          <p:cNvSpPr>
+            <a:spLocks noGrp="1"/>
+          </p:cNvSpPr>
+          <p:nvPr>
+            <p:ph idx="1"/>
+          </p:nvPr>
+        </p:nvSpPr>
+        <p:spPr>
+          <a:xfrm>
+            <a:off x="719416" y="1567174"/>
+            <a:ext cx="6383134" cy="530296"/>
+          </a:xfrm>
+        </p:spPr>
+        <p:txBody>
+          <a:bodyPr/>
+          <a:lstStyle/>
+          <a:p>
+            <a:r>
+              <a:rPr lang="en-IN" dirty="0"/>
+              <a:t>https://github.com/Ankitkumar341/stenography_project</a:t>
+            </a:r>
+          </a:p>
+        </p:txBody>
+      </p:sp>
+    </p:spTree>
+    <p:extLst>
+      <p:ext uri="{BB962C8B-B14F-4D97-AF65-F5344CB8AC3E}">
+        <p14:creationId xmlns:p14="http://schemas.microsoft.com/office/powerpoint/2010/main" val="2230664768"/>
+      </p:ext>
+    </p:extLst>
+  </p:cSld>
+  <p:clrMapOvr>
+    <a:masterClrMapping/>
+  </p:clrMapOvr>
+</p:sld>
+</file>
+
+<file path=ppt/slides/slide13.xml><?xml version="1.0" encoding="utf-8"?>
+<p:sld xmlns:a="http://schemas.openxmlformats.org/drawingml/2006/main" xmlns:r="http://schemas.openxmlformats.org/officeDocument/2006/relationships" xmlns:p="http://schemas.openxmlformats.org/presentationml/2006/main">
+  <p:cSld>
+    <p:spTree>
+      <p:nvGrpSpPr>
+        <p:cNvPr id="1" name=""/>
+        <p:cNvGrpSpPr/>
+        <p:nvPr/>
+      </p:nvGrpSpPr>
+      <p:grpSpPr>
+        <a:xfrm>
+          <a:off x="0" y="0"/>
+          <a:ext cx="0" cy="0"/>
+          <a:chOff x="0" y="0"/>
+          <a:chExt cx="0" cy="0"/>
+        </a:xfrm>
+      </p:grpSpPr>
+      <p:sp>
+        <p:nvSpPr>
           <p:cNvPr id="5" name="Title 4">
             <a:extLst>
               <a:ext uri="{FF2B5EF4-FFF2-40B4-BE49-F238E27FC236}">
@@ -5161,7 +5411,7 @@
 </p:sld>
 </file>
 
-<file path=ppt/slides/slide13.xml><?xml version="1.0" encoding="utf-8"?>
+<file path=ppt/slides/slide14.xml><?xml version="1.0" encoding="utf-8"?>
 <p:sld xmlns:a="http://schemas.openxmlformats.org/drawingml/2006/main" xmlns:r="http://schemas.openxmlformats.org/officeDocument/2006/relationships" xmlns:p="http://schemas.openxmlformats.org/presentationml/2006/main">
   <p:cSld>
     <p:spTree>
@@ -6970,7 +7220,7 @@
           <p:cNvPr id="2" name="Title 1">
             <a:extLst>
               <a:ext uri="{FF2B5EF4-FFF2-40B4-BE49-F238E27FC236}">
-                <a16:creationId xmlns:a16="http://schemas.microsoft.com/office/drawing/2014/main" id="{A4F8070C-FF0D-BBE3-3D8A-C3794CCCE8A2}"/>
+                <a16:creationId xmlns:a16="http://schemas.microsoft.com/office/drawing/2014/main" id="{6342653A-A0ED-D791-6883-1B1B7D6F2545}"/>
               </a:ext>
             </a:extLst>
           </p:cNvPr>
@@ -6992,202 +7242,106 @@
                   <a:schemeClr val="accent1"/>
                 </a:solidFill>
               </a:rPr>
-              <a:t>Results</a:t>
-            </a:r>
-          </a:p>
-        </p:txBody>
-      </p:sp>
-      <p:sp>
-        <p:nvSpPr>
-          <p:cNvPr id="4" name="Rectangle 1">
+              <a:t>Results screenshot</a:t>
+            </a:r>
+            <a:endParaRPr lang="en-US" dirty="0"/>
+          </a:p>
+        </p:txBody>
+      </p:sp>
+      <p:pic>
+        <p:nvPicPr>
+          <p:cNvPr id="5" name="Picture 4">
             <a:extLst>
               <a:ext uri="{FF2B5EF4-FFF2-40B4-BE49-F238E27FC236}">
-                <a16:creationId xmlns:a16="http://schemas.microsoft.com/office/drawing/2014/main" id="{12ABF3CD-31FE-5DF8-CBA5-F8E6B5562C16}"/>
+                <a16:creationId xmlns:a16="http://schemas.microsoft.com/office/drawing/2014/main" id="{9A534AF8-56F6-D72D-936B-CF4F76FD4E22}"/>
               </a:ext>
             </a:extLst>
           </p:cNvPr>
-          <p:cNvSpPr>
-            <a:spLocks noChangeArrowheads="1"/>
-          </p:cNvSpPr>
+          <p:cNvPicPr>
+            <a:picLocks noChangeAspect="1"/>
+          </p:cNvPicPr>
           <p:nvPr/>
-        </p:nvSpPr>
-        <p:spPr bwMode="auto">
+        </p:nvPicPr>
+        <p:blipFill>
+          <a:blip r:embed="rId2"/>
+          <a:stretch>
+            <a:fillRect/>
+          </a:stretch>
+        </p:blipFill>
+        <p:spPr>
           <a:xfrm>
-            <a:off x="774232" y="585753"/>
-            <a:ext cx="10340808" cy="4265270"/>
+            <a:off x="347512" y="1232452"/>
+            <a:ext cx="4085845" cy="2911942"/>
           </a:xfrm>
           <a:prstGeom prst="rect">
             <a:avLst/>
           </a:prstGeom>
-          <a:noFill/>
-          <a:ln>
-            <a:noFill/>
-          </a:ln>
-          <a:effectLst/>
-          <a:extLst>
-            <a:ext uri="{909E8E84-426E-40DD-AFC4-6F175D3DCCD1}">
-              <a14:hiddenFill xmlns:a14="http://schemas.microsoft.com/office/drawing/2010/main">
-                <a:solidFill>
-                  <a:schemeClr val="accent1"/>
-                </a:solidFill>
-              </a14:hiddenFill>
-            </a:ext>
-            <a:ext uri="{91240B29-F687-4F45-9708-019B960494DF}">
-              <a14:hiddenLine xmlns:a14="http://schemas.microsoft.com/office/drawing/2010/main" w="9525">
-                <a:solidFill>
-                  <a:schemeClr val="tx1"/>
-                </a:solidFill>
-                <a:miter lim="800000"/>
-                <a:headEnd/>
-                <a:tailEnd/>
-              </a14:hiddenLine>
-            </a:ext>
-            <a:ext uri="{AF507438-7753-43E0-B8FC-AC1667EBCBE1}">
-              <a14:hiddenEffects xmlns:a14="http://schemas.microsoft.com/office/drawing/2010/main">
-                <a:effectLst>
-                  <a:outerShdw dist="35921" dir="2700000" algn="ctr" rotWithShape="0">
-                    <a:schemeClr val="bg2"/>
-                  </a:outerShdw>
-                </a:effectLst>
-              </a14:hiddenEffects>
-            </a:ext>
-          </a:extLst>
         </p:spPr>
-        <p:txBody>
-          <a:bodyPr vert="horz" wrap="square" lIns="91440" tIns="45720" rIns="91440" bIns="45720" numCol="1" anchor="ctr" anchorCtr="0" compatLnSpc="1">
-            <a:prstTxWarp prst="textNoShape">
-              <a:avLst/>
-            </a:prstTxWarp>
-            <a:spAutoFit/>
-          </a:bodyPr>
-          <a:lstStyle/>
-          <a:p>
-            <a:pPr marL="346075" marR="0" lvl="0" indent="-346075" algn="l" defTabSz="914400" rtl="0" eaLnBrk="0" fontAlgn="base" latinLnBrk="0" hangingPunct="0">
-              <a:lnSpc>
-                <a:spcPct val="300000"/>
-              </a:lnSpc>
-              <a:spcBef>
-                <a:spcPct val="0"/>
-              </a:spcBef>
-              <a:spcAft>
-                <a:spcPct val="0"/>
-              </a:spcAft>
-              <a:buClrTx/>
-              <a:buSzTx/>
-              <a:buFontTx/>
-              <a:buNone/>
-              <a:tabLst/>
-            </a:pPr>
-            <a:endParaRPr kumimoji="0" lang="en-US" altLang="en-US" sz="1800" b="0" i="0" u="none" strike="noStrike" cap="none" normalizeH="0" baseline="0" dirty="0">
-              <a:ln>
-                <a:noFill/>
-              </a:ln>
-              <a:solidFill>
-                <a:schemeClr val="tx1"/>
-              </a:solidFill>
-              <a:effectLst/>
-              <a:latin typeface="Arial" panose="020B0604020202020204" pitchFamily="34" charset="0"/>
-            </a:endParaRPr>
-          </a:p>
-          <a:p>
-            <a:pPr marL="346075" marR="0" lvl="0" indent="-346075" algn="l" defTabSz="914400" rtl="0" eaLnBrk="0" fontAlgn="base" latinLnBrk="0" hangingPunct="0">
-              <a:lnSpc>
-                <a:spcPct val="250000"/>
-              </a:lnSpc>
-              <a:spcBef>
-                <a:spcPct val="0"/>
-              </a:spcBef>
-              <a:spcAft>
-                <a:spcPct val="0"/>
-              </a:spcAft>
-              <a:buClrTx/>
-              <a:buSzTx/>
-              <a:buFontTx/>
-              <a:buChar char="•"/>
-              <a:tabLst/>
-            </a:pPr>
-            <a:r>
-              <a:rPr kumimoji="0" lang="en-US" altLang="en-US" sz="1800" b="0" i="0" u="none" strike="noStrike" cap="none" normalizeH="0" baseline="0" dirty="0">
-                <a:ln>
-                  <a:noFill/>
-                </a:ln>
-                <a:solidFill>
-                  <a:schemeClr val="tx1"/>
-                </a:solidFill>
-                <a:effectLst/>
-                <a:latin typeface="Arial" panose="020B0604020202020204" pitchFamily="34" charset="0"/>
-              </a:rPr>
-              <a:t>The project successfully hides and retrieves encrypted data within image files, ensuring that the original image's visual quality remains intact.</a:t>
-            </a:r>
-          </a:p>
-          <a:p>
-            <a:pPr marL="346075" marR="0" lvl="0" indent="-346075" algn="l" defTabSz="914400" rtl="0" eaLnBrk="0" fontAlgn="base" latinLnBrk="0" hangingPunct="0">
-              <a:lnSpc>
-                <a:spcPct val="250000"/>
-              </a:lnSpc>
-              <a:spcBef>
-                <a:spcPct val="0"/>
-              </a:spcBef>
-              <a:spcAft>
-                <a:spcPct val="0"/>
-              </a:spcAft>
-              <a:buClrTx/>
-              <a:buSzTx/>
-              <a:buFontTx/>
-              <a:buChar char="•"/>
-              <a:tabLst/>
-            </a:pPr>
-            <a:r>
-              <a:rPr kumimoji="0" lang="en-US" altLang="en-US" sz="1800" b="0" i="0" u="none" strike="noStrike" cap="none" normalizeH="0" baseline="0" dirty="0">
-                <a:ln>
-                  <a:noFill/>
-                </a:ln>
-                <a:solidFill>
-                  <a:schemeClr val="tx1"/>
-                </a:solidFill>
-                <a:effectLst/>
-                <a:latin typeface="Arial" panose="020B0604020202020204" pitchFamily="34" charset="0"/>
-              </a:rPr>
-              <a:t>The cryptographic techniques ensure that even if someone accesses the image, the hidden data remains protected, only retrievable by authorized users.</a:t>
-            </a:r>
-          </a:p>
-          <a:p>
-            <a:pPr marL="346075" marR="0" lvl="0" indent="-346075" algn="l" defTabSz="914400" rtl="0" eaLnBrk="0" fontAlgn="base" latinLnBrk="0" hangingPunct="0">
-              <a:lnSpc>
-                <a:spcPct val="250000"/>
-              </a:lnSpc>
-              <a:spcBef>
-                <a:spcPct val="0"/>
-              </a:spcBef>
-              <a:spcAft>
-                <a:spcPct val="0"/>
-              </a:spcAft>
-              <a:buClrTx/>
-              <a:buSzTx/>
-              <a:buFontTx/>
-              <a:buChar char="•"/>
-              <a:tabLst/>
-            </a:pPr>
-            <a:r>
-              <a:rPr kumimoji="0" lang="en-US" altLang="en-US" sz="1800" b="0" i="0" u="none" strike="noStrike" cap="none" normalizeH="0" baseline="0" dirty="0">
-                <a:ln>
-                  <a:noFill/>
-                </a:ln>
-                <a:solidFill>
-                  <a:schemeClr val="tx1"/>
-                </a:solidFill>
-                <a:effectLst/>
-                <a:latin typeface="Arial" panose="020B0604020202020204" pitchFamily="34" charset="0"/>
-              </a:rPr>
-              <a:t>A functional tool for secure communication using steganography and encryption methods. </a:t>
-            </a:r>
-          </a:p>
-        </p:txBody>
-      </p:sp>
+      </p:pic>
+      <p:pic>
+        <p:nvPicPr>
+          <p:cNvPr id="7" name="Picture 6">
+            <a:extLst>
+              <a:ext uri="{FF2B5EF4-FFF2-40B4-BE49-F238E27FC236}">
+                <a16:creationId xmlns:a16="http://schemas.microsoft.com/office/drawing/2014/main" id="{E125C6CA-A769-E91A-F121-6990136105F1}"/>
+              </a:ext>
+            </a:extLst>
+          </p:cNvPr>
+          <p:cNvPicPr>
+            <a:picLocks noChangeAspect="1"/>
+          </p:cNvPicPr>
+          <p:nvPr/>
+        </p:nvPicPr>
+        <p:blipFill>
+          <a:blip r:embed="rId3"/>
+          <a:stretch>
+            <a:fillRect/>
+          </a:stretch>
+        </p:blipFill>
+        <p:spPr>
+          <a:xfrm>
+            <a:off x="7260944" y="1232452"/>
+            <a:ext cx="3826722" cy="2911941"/>
+          </a:xfrm>
+          <a:prstGeom prst="rect">
+            <a:avLst/>
+          </a:prstGeom>
+        </p:spPr>
+      </p:pic>
+      <p:pic>
+        <p:nvPicPr>
+          <p:cNvPr id="9" name="Picture 8">
+            <a:extLst>
+              <a:ext uri="{FF2B5EF4-FFF2-40B4-BE49-F238E27FC236}">
+                <a16:creationId xmlns:a16="http://schemas.microsoft.com/office/drawing/2014/main" id="{05376A25-94A6-37A5-724C-7F73C8006867}"/>
+              </a:ext>
+            </a:extLst>
+          </p:cNvPr>
+          <p:cNvPicPr>
+            <a:picLocks noChangeAspect="1"/>
+          </p:cNvPicPr>
+          <p:nvPr/>
+        </p:nvPicPr>
+        <p:blipFill>
+          <a:blip r:embed="rId4"/>
+          <a:stretch>
+            <a:fillRect/>
+          </a:stretch>
+        </p:blipFill>
+        <p:spPr>
+          <a:xfrm>
+            <a:off x="3413760" y="4144393"/>
+            <a:ext cx="4958080" cy="2642487"/>
+          </a:xfrm>
+          <a:prstGeom prst="rect">
+            <a:avLst/>
+          </a:prstGeom>
+        </p:spPr>
+      </p:pic>
     </p:spTree>
     <p:extLst>
       <p:ext uri="{BB962C8B-B14F-4D97-AF65-F5344CB8AC3E}">
-        <p14:creationId xmlns:p14="http://schemas.microsoft.com/office/powerpoint/2010/main" val="2083715239"/>
+        <p14:creationId xmlns:p14="http://schemas.microsoft.com/office/powerpoint/2010/main" val="530456761"/>
       </p:ext>
     </p:extLst>
   </p:cSld>
@@ -7762,23 +7916,6 @@
 </file>
 
 <file path=customXml/item1.xml><?xml version="1.0" encoding="utf-8"?>
-<p:properties xmlns:p="http://schemas.microsoft.com/office/2006/metadata/properties" xmlns:xsi="http://www.w3.org/2001/XMLSchema-instance" xmlns:pc="http://schemas.microsoft.com/office/infopath/2007/PartnerControls">
-  <documentManagement>
-    <_activity xmlns="b30265f8-c5e2-4918-b4a1-b977299ca3e2" xsi:nil="true"/>
-  </documentManagement>
-</p:properties>
-</file>
-
-<file path=customXml/item2.xml><?xml version="1.0" encoding="utf-8"?>
-<?mso-contentType ?>
-<FormTemplates xmlns="http://schemas.microsoft.com/sharepoint/v3/contenttype/forms">
-  <Display>DocumentLibraryForm</Display>
-  <Edit>DocumentLibraryForm</Edit>
-  <New>DocumentLibraryForm</New>
-</FormTemplates>
-</file>
-
-<file path=customXml/item3.xml><?xml version="1.0" encoding="utf-8"?>
 <ct:contentTypeSchema xmlns:ct="http://schemas.microsoft.com/office/2006/metadata/contentType" xmlns:ma="http://schemas.microsoft.com/office/2006/metadata/properties/metaAttributes" ct:_="" ma:_="" ma:contentTypeName="Document" ma:contentTypeID="0x0101007F0268AC5E70984D8FE60B7154176407" ma:contentTypeVersion="15" ma:contentTypeDescription="Create a new document." ma:contentTypeScope="" ma:versionID="104e359103f0f57b1cf9676756e5b944">
   <xsd:schema xmlns:xsd="http://www.w3.org/2001/XMLSchema" xmlns:xs="http://www.w3.org/2001/XMLSchema" xmlns:p="http://schemas.microsoft.com/office/2006/metadata/properties" xmlns:ns3="b30265f8-c5e2-4918-b4a1-b977299ca3e2" xmlns:ns4="fadb41d3-f9cb-40fb-903c-8cacaba95bb5" targetNamespace="http://schemas.microsoft.com/office/2006/metadata/properties" ma:root="true" ma:fieldsID="5615b8f8aa772998bad551f24a33de0e" ns3:_="" ns4:_="">
     <xsd:import namespace="b30265f8-c5e2-4918-b4a1-b977299ca3e2"/>
@@ -8011,32 +8148,24 @@
 </ct:contentTypeSchema>
 </file>
 
-<file path=customXml/itemProps1.xml><?xml version="1.0" encoding="utf-8"?>
-<ds:datastoreItem xmlns:ds="http://schemas.openxmlformats.org/officeDocument/2006/customXml" ds:itemID="{8D289AE2-D2AE-49D1-AFAC-3A79F6794255}">
-  <ds:schemaRefs>
-    <ds:schemaRef ds:uri="http://schemas.openxmlformats.org/package/2006/metadata/core-properties"/>
-    <ds:schemaRef ds:uri="http://schemas.microsoft.com/office/2006/documentManagement/types"/>
-    <ds:schemaRef ds:uri="http://purl.org/dc/dcmitype/"/>
-    <ds:schemaRef ds:uri="http://schemas.microsoft.com/office/infopath/2007/PartnerControls"/>
-    <ds:schemaRef ds:uri="http://purl.org/dc/elements/1.1/"/>
-    <ds:schemaRef ds:uri="http://schemas.microsoft.com/office/2006/metadata/properties"/>
-    <ds:schemaRef ds:uri="fadb41d3-f9cb-40fb-903c-8cacaba95bb5"/>
-    <ds:schemaRef ds:uri="http://purl.org/dc/terms/"/>
-    <ds:schemaRef ds:uri="b30265f8-c5e2-4918-b4a1-b977299ca3e2"/>
-    <ds:schemaRef ds:uri="http://www.w3.org/XML/1998/namespace"/>
-  </ds:schemaRefs>
-</ds:datastoreItem>
+<file path=customXml/item2.xml><?xml version="1.0" encoding="utf-8"?>
+<?mso-contentType ?>
+<FormTemplates xmlns="http://schemas.microsoft.com/sharepoint/v3/contenttype/forms">
+  <Display>DocumentLibraryForm</Display>
+  <Edit>DocumentLibraryForm</Edit>
+  <New>DocumentLibraryForm</New>
+</FormTemplates>
 </file>
 
-<file path=customXml/itemProps2.xml><?xml version="1.0" encoding="utf-8"?>
-<ds:datastoreItem xmlns:ds="http://schemas.openxmlformats.org/officeDocument/2006/customXml" ds:itemID="{927BD4C1-B6B1-4715-ABF9-E660A51A4EA0}">
-  <ds:schemaRefs>
-    <ds:schemaRef ds:uri="http://schemas.microsoft.com/sharepoint/v3/contenttype/forms"/>
-  </ds:schemaRefs>
-</ds:datastoreItem>
+<file path=customXml/item3.xml><?xml version="1.0" encoding="utf-8"?>
+<p:properties xmlns:p="http://schemas.microsoft.com/office/2006/metadata/properties" xmlns:xsi="http://www.w3.org/2001/XMLSchema-instance" xmlns:pc="http://schemas.microsoft.com/office/infopath/2007/PartnerControls">
+  <documentManagement>
+    <_activity xmlns="b30265f8-c5e2-4918-b4a1-b977299ca3e2" xsi:nil="true"/>
+  </documentManagement>
+</p:properties>
 </file>
 
-<file path=customXml/itemProps3.xml><?xml version="1.0" encoding="utf-8"?>
+<file path=customXml/itemProps1.xml><?xml version="1.0" encoding="utf-8"?>
 <ds:datastoreItem xmlns:ds="http://schemas.openxmlformats.org/officeDocument/2006/customXml" ds:itemID="{9DD71778-17EE-4151-88AE-C8F4E8043BD9}">
   <ds:schemaRefs>
     <ds:schemaRef ds:uri="http://schemas.microsoft.com/office/2006/metadata/contentType"/>
@@ -8053,4 +8182,29 @@
     <ds:schemaRef ds:uri="http://schemas.microsoft.com/internal/obd"/>
   </ds:schemaRefs>
 </ds:datastoreItem>
+</file>
+
+<file path=customXml/itemProps2.xml><?xml version="1.0" encoding="utf-8"?>
+<ds:datastoreItem xmlns:ds="http://schemas.openxmlformats.org/officeDocument/2006/customXml" ds:itemID="{927BD4C1-B6B1-4715-ABF9-E660A51A4EA0}">
+  <ds:schemaRefs>
+    <ds:schemaRef ds:uri="http://schemas.microsoft.com/sharepoint/v3/contenttype/forms"/>
+  </ds:schemaRefs>
+</ds:datastoreItem>
+</file>
+
+<file path=customXml/itemProps3.xml><?xml version="1.0" encoding="utf-8"?>
+<ds:datastoreItem xmlns:ds="http://schemas.openxmlformats.org/officeDocument/2006/customXml" ds:itemID="{8D289AE2-D2AE-49D1-AFAC-3A79F6794255}">
+  <ds:schemaRefs>
+    <ds:schemaRef ds:uri="http://schemas.openxmlformats.org/package/2006/metadata/core-properties"/>
+    <ds:schemaRef ds:uri="http://schemas.microsoft.com/office/2006/documentManagement/types"/>
+    <ds:schemaRef ds:uri="http://purl.org/dc/dcmitype/"/>
+    <ds:schemaRef ds:uri="http://schemas.microsoft.com/office/infopath/2007/PartnerControls"/>
+    <ds:schemaRef ds:uri="http://purl.org/dc/elements/1.1/"/>
+    <ds:schemaRef ds:uri="http://schemas.microsoft.com/office/2006/metadata/properties"/>
+    <ds:schemaRef ds:uri="fadb41d3-f9cb-40fb-903c-8cacaba95bb5"/>
+    <ds:schemaRef ds:uri="http://purl.org/dc/terms/"/>
+    <ds:schemaRef ds:uri="b30265f8-c5e2-4918-b4a1-b977299ca3e2"/>
+    <ds:schemaRef ds:uri="http://www.w3.org/XML/1998/namespace"/>
+  </ds:schemaRefs>
+</ds:datastoreItem>
 </file>
</xml_diff>